<commit_message>
added new content and examples
</commit_message>
<xml_diff>
--- a/CSCI-111/week-3/week-3-lecture.pptx
+++ b/CSCI-111/week-3/week-3-lecture.pptx
@@ -281,7 +281,7 @@
       </p15:sldGuideLst>
     </p:ext>
     <p:ext uri="GoogleSlidesCustomDataVersion2">
-      <go:slidesCustomData xmlns:go="http://customooxmlschemas.google.com/" r:id="rId31" roundtripDataSignature="AMtx7mg75LW+kIS967rnElYuqlnvPGKYOg=="/>
+      <go:slidesCustomData xmlns:go="http://customooxmlschemas.google.com/" r:id="rId31" roundtripDataSignature="AMtx7mjOtm3OrzQE+SAHNd8vLn9z+8ljNg=="/>
     </p:ext>
   </p:extLst>
 </p:presentation>
@@ -2374,7 +2374,7 @@
   <p:cSld>
     <p:spTree>
       <p:nvGrpSpPr>
-        <p:cNvPr id="273" name="Shape 273"/>
+        <p:cNvPr id="274" name="Shape 274"/>
         <p:cNvGrpSpPr/>
         <p:nvPr/>
       </p:nvGrpSpPr>
@@ -2388,7 +2388,7 @@
       </p:grpSpPr>
       <p:sp>
         <p:nvSpPr>
-          <p:cNvPr id="274" name="Google Shape;274;g3296ee86163_1_29:notes"/>
+          <p:cNvPr id="275" name="Google Shape;275;g3296ee86163_1_29:notes"/>
           <p:cNvSpPr/>
           <p:nvPr>
             <p:ph idx="2" type="sldImg"/>
@@ -2433,7 +2433,7 @@
       </p:sp>
       <p:sp>
         <p:nvSpPr>
-          <p:cNvPr id="275" name="Google Shape;275;g3296ee86163_1_29:notes"/>
+          <p:cNvPr id="276" name="Google Shape;276;g3296ee86163_1_29:notes"/>
           <p:cNvSpPr txBox="1"/>
           <p:nvPr>
             <p:ph idx="1" type="body"/>
@@ -2491,7 +2491,7 @@
   <p:cSld>
     <p:spTree>
       <p:nvGrpSpPr>
-        <p:cNvPr id="278" name="Shape 278"/>
+        <p:cNvPr id="279" name="Shape 279"/>
         <p:cNvGrpSpPr/>
         <p:nvPr/>
       </p:nvGrpSpPr>
@@ -2505,7 +2505,7 @@
       </p:grpSpPr>
       <p:sp>
         <p:nvSpPr>
-          <p:cNvPr id="279" name="Google Shape;279;g2f62552a751_0_61:notes"/>
+          <p:cNvPr id="280" name="Google Shape;280;g2f62552a751_0_61:notes"/>
           <p:cNvSpPr/>
           <p:nvPr>
             <p:ph idx="2" type="sldImg"/>
@@ -2550,7 +2550,7 @@
       </p:sp>
       <p:sp>
         <p:nvSpPr>
-          <p:cNvPr id="280" name="Google Shape;280;g2f62552a751_0_61:notes"/>
+          <p:cNvPr id="281" name="Google Shape;281;g2f62552a751_0_61:notes"/>
           <p:cNvSpPr txBox="1"/>
           <p:nvPr>
             <p:ph idx="1" type="body"/>
@@ -2608,7 +2608,7 @@
   <p:cSld>
     <p:spTree>
       <p:nvGrpSpPr>
-        <p:cNvPr id="287" name="Shape 287"/>
+        <p:cNvPr id="288" name="Shape 288"/>
         <p:cNvGrpSpPr/>
         <p:nvPr/>
       </p:nvGrpSpPr>
@@ -2622,7 +2622,7 @@
       </p:grpSpPr>
       <p:sp>
         <p:nvSpPr>
-          <p:cNvPr id="288" name="Google Shape;288;g2f62552a751_0_66:notes"/>
+          <p:cNvPr id="289" name="Google Shape;289;g2f62552a751_0_66:notes"/>
           <p:cNvSpPr/>
           <p:nvPr>
             <p:ph idx="2" type="sldImg"/>
@@ -2667,7 +2667,7 @@
       </p:sp>
       <p:sp>
         <p:nvSpPr>
-          <p:cNvPr id="289" name="Google Shape;289;g2f62552a751_0_66:notes"/>
+          <p:cNvPr id="290" name="Google Shape;290;g2f62552a751_0_66:notes"/>
           <p:cNvSpPr txBox="1"/>
           <p:nvPr>
             <p:ph idx="1" type="body"/>
@@ -2725,7 +2725,7 @@
   <p:cSld>
     <p:spTree>
       <p:nvGrpSpPr>
-        <p:cNvPr id="295" name="Shape 295"/>
+        <p:cNvPr id="296" name="Shape 296"/>
         <p:cNvGrpSpPr/>
         <p:nvPr/>
       </p:nvGrpSpPr>
@@ -2739,7 +2739,7 @@
       </p:grpSpPr>
       <p:sp>
         <p:nvSpPr>
-          <p:cNvPr id="296" name="Google Shape;296;p16:notes"/>
+          <p:cNvPr id="297" name="Google Shape;297;p16:notes"/>
           <p:cNvSpPr/>
           <p:nvPr>
             <p:ph idx="2" type="sldImg"/>
@@ -2784,7 +2784,7 @@
       </p:sp>
       <p:sp>
         <p:nvSpPr>
-          <p:cNvPr id="297" name="Google Shape;297;p16:notes"/>
+          <p:cNvPr id="298" name="Google Shape;298;p16:notes"/>
           <p:cNvSpPr txBox="1"/>
           <p:nvPr>
             <p:ph idx="1" type="body"/>
@@ -2842,7 +2842,7 @@
   <p:cSld>
     <p:spTree>
       <p:nvGrpSpPr>
-        <p:cNvPr id="301" name="Shape 301"/>
+        <p:cNvPr id="302" name="Shape 302"/>
         <p:cNvGrpSpPr/>
         <p:nvPr/>
       </p:nvGrpSpPr>
@@ -2856,7 +2856,7 @@
       </p:grpSpPr>
       <p:sp>
         <p:nvSpPr>
-          <p:cNvPr id="302" name="Google Shape;302;g2f62552a751_0_76:notes"/>
+          <p:cNvPr id="303" name="Google Shape;303;g2f62552a751_0_76:notes"/>
           <p:cNvSpPr/>
           <p:nvPr>
             <p:ph idx="2" type="sldImg"/>
@@ -2901,7 +2901,7 @@
       </p:sp>
       <p:sp>
         <p:nvSpPr>
-          <p:cNvPr id="303" name="Google Shape;303;g2f62552a751_0_76:notes"/>
+          <p:cNvPr id="304" name="Google Shape;304;g2f62552a751_0_76:notes"/>
           <p:cNvSpPr txBox="1"/>
           <p:nvPr>
             <p:ph idx="1" type="body"/>
@@ -20921,7 +20921,7 @@
         </p:nvSpPr>
         <p:spPr>
           <a:xfrm>
-            <a:off x="2270100" y="1705300"/>
+            <a:off x="2092775" y="1705300"/>
             <a:ext cx="4115100" cy="1621200"/>
           </a:xfrm>
           <a:prstGeom prst="rect">
@@ -21385,7 +21385,7 @@
                 <a:cs typeface="Courier New"/>
                 <a:sym typeface="Courier New"/>
               </a:rPr>
-              <a:t>     &lt;ul class="list-1"&gt;</a:t>
+              <a:t>&lt;ul class="list-1"&gt;</a:t>
             </a:r>
             <a:endParaRPr b="1" sz="1200">
               <a:latin typeface="Courier New"/>
@@ -21411,7 +21411,7 @@
                 <a:cs typeface="Courier New"/>
                 <a:sym typeface="Courier New"/>
               </a:rPr>
-              <a:t>        &lt;li id="item-1-li" name="item-1"&gt;North&lt;/li&gt;</a:t>
+              <a:t>    &lt;li id="item-1-li" name="item-1"&gt;North&lt;/li&gt;</a:t>
             </a:r>
             <a:endParaRPr b="1" sz="1200">
               <a:latin typeface="Courier New"/>
@@ -21437,7 +21437,7 @@
                 <a:cs typeface="Courier New"/>
                 <a:sym typeface="Courier New"/>
               </a:rPr>
-              <a:t>        &lt;li class="list-2"&gt;South&lt;/li&gt;</a:t>
+              <a:t>    &lt;li class="list-2"&gt;South&lt;/li&gt;</a:t>
             </a:r>
             <a:endParaRPr b="1" sz="1200">
               <a:latin typeface="Courier New"/>
@@ -21463,7 +21463,7 @@
                 <a:cs typeface="Courier New"/>
                 <a:sym typeface="Courier New"/>
               </a:rPr>
-              <a:t>        &lt;li&gt;East&lt;/li&gt;</a:t>
+              <a:t>    &lt;li&gt;East&lt;/li&gt;</a:t>
             </a:r>
             <a:endParaRPr b="1" sz="1200">
               <a:latin typeface="Courier New"/>
@@ -21489,7 +21489,7 @@
                 <a:cs typeface="Courier New"/>
                 <a:sym typeface="Courier New"/>
               </a:rPr>
-              <a:t>        &lt;li name="item-4"&gt;West&lt;/li&gt;</a:t>
+              <a:t>    &lt;li name="item-4"&gt;West&lt;/li&gt;</a:t>
             </a:r>
             <a:endParaRPr b="1" sz="1200">
               <a:latin typeface="Courier New"/>
@@ -21515,7 +21515,7 @@
                 <a:cs typeface="Courier New"/>
                 <a:sym typeface="Courier New"/>
               </a:rPr>
-              <a:t>      &lt;/ul&gt;</a:t>
+              <a:t>&lt;/ul&gt;</a:t>
             </a:r>
             <a:endParaRPr b="1" sz="1200">
               <a:latin typeface="Courier New"/>
@@ -22462,7 +22462,7 @@
                 <a:cs typeface="Courier New"/>
                 <a:sym typeface="Courier New"/>
               </a:rPr>
-              <a:t>     &lt;ul class="list-1"&gt;</a:t>
+              <a:t>&lt;ul class="list-1"&gt;</a:t>
             </a:r>
             <a:endParaRPr b="1" sz="1200">
               <a:latin typeface="Courier New"/>
@@ -22488,7 +22488,7 @@
                 <a:cs typeface="Courier New"/>
                 <a:sym typeface="Courier New"/>
               </a:rPr>
-              <a:t>        &lt;li id="item-1-li" name="item-1"&gt;North&lt;/li&gt;</a:t>
+              <a:t>    &lt;li id="item-1-li" name="item-1"&gt;North&lt;/li&gt;</a:t>
             </a:r>
             <a:endParaRPr b="1" sz="1200">
               <a:latin typeface="Courier New"/>
@@ -22514,7 +22514,7 @@
                 <a:cs typeface="Courier New"/>
                 <a:sym typeface="Courier New"/>
               </a:rPr>
-              <a:t>        &lt;li class="list-2"&gt;South&lt;/li&gt;</a:t>
+              <a:t>    &lt;li class="list-2"&gt;South&lt;/li&gt;</a:t>
             </a:r>
             <a:endParaRPr b="1" sz="1200">
               <a:latin typeface="Courier New"/>
@@ -22540,7 +22540,7 @@
                 <a:cs typeface="Courier New"/>
                 <a:sym typeface="Courier New"/>
               </a:rPr>
-              <a:t>        &lt;li&gt;East&lt;/li&gt;</a:t>
+              <a:t>    &lt;li&gt;East&lt;/li&gt;</a:t>
             </a:r>
             <a:endParaRPr b="1" sz="1200">
               <a:latin typeface="Courier New"/>
@@ -22566,7 +22566,7 @@
                 <a:cs typeface="Courier New"/>
                 <a:sym typeface="Courier New"/>
               </a:rPr>
-              <a:t>        &lt;li name="item-4"&gt;West&lt;/li&gt;</a:t>
+              <a:t>    &lt;li name="item-4"&gt;West&lt;/li&gt;</a:t>
             </a:r>
             <a:endParaRPr b="1" sz="1200">
               <a:latin typeface="Courier New"/>
@@ -22592,7 +22592,7 @@
                 <a:cs typeface="Courier New"/>
                 <a:sym typeface="Courier New"/>
               </a:rPr>
-              <a:t>      &lt;/ul&gt;</a:t>
+              <a:t>&lt;/ul&gt;</a:t>
             </a:r>
             <a:endParaRPr b="1" sz="1200">
               <a:latin typeface="Courier New"/>
@@ -23657,8 +23657,8 @@
         </p:nvSpPr>
         <p:spPr>
           <a:xfrm>
-            <a:off x="0" y="2341325"/>
-            <a:ext cx="6727200" cy="2770500"/>
+            <a:off x="0" y="2373000"/>
+            <a:ext cx="2046300" cy="2770500"/>
           </a:xfrm>
           <a:prstGeom prst="rect">
             <a:avLst/>
@@ -23684,7 +23684,7 @@
               <a:buNone/>
             </a:pPr>
             <a:r>
-              <a:rPr lang="en" sz="1200">
+              <a:rPr b="1" lang="en" sz="1200">
                 <a:latin typeface="Courier New"/>
                 <a:ea typeface="Courier New"/>
                 <a:cs typeface="Courier New"/>
@@ -23692,7 +23692,7 @@
               </a:rPr>
               <a:t>&lt;style&gt;</a:t>
             </a:r>
-            <a:endParaRPr sz="1200">
+            <a:endParaRPr b="1" sz="1200">
               <a:latin typeface="Courier New"/>
               <a:ea typeface="Courier New"/>
               <a:cs typeface="Courier New"/>
@@ -23710,7 +23710,7 @@
               <a:buNone/>
             </a:pPr>
             <a:r>
-              <a:rPr lang="en" sz="1200">
+              <a:rPr b="1" lang="en" sz="1200">
                 <a:latin typeface="Courier New"/>
                 <a:ea typeface="Courier New"/>
                 <a:cs typeface="Courier New"/>
@@ -23718,7 +23718,7 @@
               </a:rPr>
               <a:t>#last</a:t>
             </a:r>
-            <a:endParaRPr sz="1200">
+            <a:endParaRPr b="1" sz="1200">
               <a:latin typeface="Courier New"/>
               <a:ea typeface="Courier New"/>
               <a:cs typeface="Courier New"/>
@@ -23736,7 +23736,7 @@
               <a:buNone/>
             </a:pPr>
             <a:r>
-              <a:rPr lang="en" sz="1200">
+              <a:rPr b="1" lang="en" sz="1200">
                 <a:latin typeface="Courier New"/>
                 <a:ea typeface="Courier New"/>
                 <a:cs typeface="Courier New"/>
@@ -23744,7 +23744,7 @@
               </a:rPr>
               <a:t>{</a:t>
             </a:r>
-            <a:endParaRPr sz="1200">
+            <a:endParaRPr b="1" sz="1200">
               <a:latin typeface="Courier New"/>
               <a:ea typeface="Courier New"/>
               <a:cs typeface="Courier New"/>
@@ -23762,7 +23762,7 @@
               <a:buNone/>
             </a:pPr>
             <a:r>
-              <a:rPr lang="en" sz="1200">
+              <a:rPr b="1" lang="en" sz="1200">
                 <a:latin typeface="Courier New"/>
                 <a:ea typeface="Courier New"/>
                 <a:cs typeface="Courier New"/>
@@ -23770,7 +23770,7 @@
               </a:rPr>
               <a:t>color: blue;</a:t>
             </a:r>
-            <a:endParaRPr sz="1200">
+            <a:endParaRPr b="1" sz="1200">
               <a:latin typeface="Courier New"/>
               <a:ea typeface="Courier New"/>
               <a:cs typeface="Courier New"/>
@@ -23788,7 +23788,7 @@
               <a:buNone/>
             </a:pPr>
             <a:r>
-              <a:rPr lang="en" sz="1200">
+              <a:rPr b="1" lang="en" sz="1200">
                 <a:latin typeface="Courier New"/>
                 <a:ea typeface="Courier New"/>
                 <a:cs typeface="Courier New"/>
@@ -23796,7 +23796,7 @@
               </a:rPr>
               <a:t>}</a:t>
             </a:r>
-            <a:endParaRPr sz="1200">
+            <a:endParaRPr b="1" sz="1200">
               <a:latin typeface="Courier New"/>
               <a:ea typeface="Courier New"/>
               <a:cs typeface="Courier New"/>
@@ -23814,7 +23814,7 @@
               <a:buNone/>
             </a:pPr>
             <a:r>
-              <a:rPr lang="en" sz="1200">
+              <a:rPr b="1" lang="en" sz="1200">
                 <a:latin typeface="Courier New"/>
                 <a:ea typeface="Courier New"/>
                 <a:cs typeface="Courier New"/>
@@ -23822,7 +23822,7 @@
               </a:rPr>
               <a:t>.spanClass</a:t>
             </a:r>
-            <a:endParaRPr sz="1200">
+            <a:endParaRPr b="1" sz="1200">
               <a:latin typeface="Courier New"/>
               <a:ea typeface="Courier New"/>
               <a:cs typeface="Courier New"/>
@@ -23840,7 +23840,7 @@
               <a:buNone/>
             </a:pPr>
             <a:r>
-              <a:rPr lang="en" sz="1200">
+              <a:rPr b="1" lang="en" sz="1200">
                 <a:latin typeface="Courier New"/>
                 <a:ea typeface="Courier New"/>
                 <a:cs typeface="Courier New"/>
@@ -23848,7 +23848,7 @@
               </a:rPr>
               <a:t>{</a:t>
             </a:r>
-            <a:endParaRPr sz="1200">
+            <a:endParaRPr b="1" sz="1200">
               <a:latin typeface="Courier New"/>
               <a:ea typeface="Courier New"/>
               <a:cs typeface="Courier New"/>
@@ -23866,7 +23866,7 @@
               <a:buNone/>
             </a:pPr>
             <a:r>
-              <a:rPr lang="en" sz="1200">
+              <a:rPr b="1" lang="en" sz="1200">
                 <a:latin typeface="Courier New"/>
                 <a:ea typeface="Courier New"/>
                 <a:cs typeface="Courier New"/>
@@ -23874,7 +23874,7 @@
               </a:rPr>
               <a:t>color: red;</a:t>
             </a:r>
-            <a:endParaRPr sz="1200">
+            <a:endParaRPr b="1" sz="1200">
               <a:latin typeface="Courier New"/>
               <a:ea typeface="Courier New"/>
               <a:cs typeface="Courier New"/>
@@ -23892,7 +23892,7 @@
               <a:buNone/>
             </a:pPr>
             <a:r>
-              <a:rPr lang="en" sz="1200">
+              <a:rPr b="1" lang="en" sz="1200">
                 <a:latin typeface="Courier New"/>
                 <a:ea typeface="Courier New"/>
                 <a:cs typeface="Courier New"/>
@@ -23900,7 +23900,7 @@
               </a:rPr>
               <a:t>}</a:t>
             </a:r>
-            <a:endParaRPr sz="1200">
+            <a:endParaRPr b="1" sz="1200">
               <a:latin typeface="Courier New"/>
               <a:ea typeface="Courier New"/>
               <a:cs typeface="Courier New"/>
@@ -23918,7 +23918,7 @@
               <a:buNone/>
             </a:pPr>
             <a:r>
-              <a:rPr lang="en" sz="1200">
+              <a:rPr b="1" lang="en" sz="1200">
                 <a:latin typeface="Courier New"/>
                 <a:ea typeface="Courier New"/>
                 <a:cs typeface="Courier New"/>
@@ -23926,7 +23926,7 @@
               </a:rPr>
               <a:t>p &gt; span</a:t>
             </a:r>
-            <a:endParaRPr sz="1200">
+            <a:endParaRPr b="1" sz="1200">
               <a:latin typeface="Courier New"/>
               <a:ea typeface="Courier New"/>
               <a:cs typeface="Courier New"/>
@@ -23944,7 +23944,7 @@
               <a:buNone/>
             </a:pPr>
             <a:r>
-              <a:rPr lang="en" sz="1200">
+              <a:rPr b="1" lang="en" sz="1200">
                 <a:latin typeface="Courier New"/>
                 <a:ea typeface="Courier New"/>
                 <a:cs typeface="Courier New"/>
@@ -23952,7 +23952,7 @@
               </a:rPr>
               <a:t>{</a:t>
             </a:r>
-            <a:endParaRPr sz="1200">
+            <a:endParaRPr b="1" sz="1200">
               <a:latin typeface="Courier New"/>
               <a:ea typeface="Courier New"/>
               <a:cs typeface="Courier New"/>
@@ -23970,7 +23970,7 @@
               <a:buNone/>
             </a:pPr>
             <a:r>
-              <a:rPr lang="en" sz="1200">
+              <a:rPr b="1" lang="en" sz="1200">
                 <a:latin typeface="Courier New"/>
                 <a:ea typeface="Courier New"/>
                 <a:cs typeface="Courier New"/>
@@ -23978,7 +23978,7 @@
               </a:rPr>
               <a:t>color: green;</a:t>
             </a:r>
-            <a:endParaRPr sz="1200">
+            <a:endParaRPr b="1" sz="1200">
               <a:latin typeface="Courier New"/>
               <a:ea typeface="Courier New"/>
               <a:cs typeface="Courier New"/>
@@ -23996,7 +23996,7 @@
               <a:buNone/>
             </a:pPr>
             <a:r>
-              <a:rPr lang="en" sz="1200">
+              <a:rPr b="1" lang="en" sz="1200">
                 <a:latin typeface="Courier New"/>
                 <a:ea typeface="Courier New"/>
                 <a:cs typeface="Courier New"/>
@@ -24004,7 +24004,7 @@
               </a:rPr>
               <a:t>}</a:t>
             </a:r>
-            <a:endParaRPr sz="1200">
+            <a:endParaRPr b="1" sz="1200">
               <a:latin typeface="Courier New"/>
               <a:ea typeface="Courier New"/>
               <a:cs typeface="Courier New"/>
@@ -24022,7 +24022,7 @@
               <a:buNone/>
             </a:pPr>
             <a:r>
-              <a:rPr lang="en" sz="1200">
+              <a:rPr b="1" lang="en" sz="1200">
                 <a:latin typeface="Courier New"/>
                 <a:ea typeface="Courier New"/>
                 <a:cs typeface="Courier New"/>
@@ -24030,7 +24030,7 @@
               </a:rPr>
               <a:t>&lt;/style&gt;</a:t>
             </a:r>
-            <a:endParaRPr sz="1200">
+            <a:endParaRPr b="1" sz="1200">
               <a:latin typeface="Courier New"/>
               <a:ea typeface="Courier New"/>
               <a:cs typeface="Courier New"/>
@@ -24047,7 +24047,7 @@
         </p:nvSpPr>
         <p:spPr>
           <a:xfrm>
-            <a:off x="1892650" y="2641850"/>
+            <a:off x="2046300" y="2784000"/>
             <a:ext cx="1899000" cy="735900"/>
           </a:xfrm>
           <a:prstGeom prst="rect">
@@ -24172,7 +24172,7 @@
         </p:nvSpPr>
         <p:spPr>
           <a:xfrm>
-            <a:off x="1892650" y="3377750"/>
+            <a:off x="2046300" y="3519900"/>
             <a:ext cx="1899000" cy="735900"/>
           </a:xfrm>
           <a:prstGeom prst="rect">
@@ -24230,7 +24230,7 @@
         </p:nvSpPr>
         <p:spPr>
           <a:xfrm>
-            <a:off x="1892650" y="4113650"/>
+            <a:off x="2046300" y="4255800"/>
             <a:ext cx="1899000" cy="735900"/>
           </a:xfrm>
           <a:prstGeom prst="rect">
@@ -24280,6 +24280,80 @@
           </a:p>
         </p:txBody>
       </p:sp>
+      <p:sp>
+        <p:nvSpPr>
+          <p:cNvPr id="273" name="Google Shape;273;g329b0af9a98_0_42"/>
+          <p:cNvSpPr txBox="1"/>
+          <p:nvPr/>
+        </p:nvSpPr>
+        <p:spPr>
+          <a:xfrm>
+            <a:off x="0" y="1706550"/>
+            <a:ext cx="9144000" cy="831300"/>
+          </a:xfrm>
+          <a:prstGeom prst="rect">
+            <a:avLst/>
+          </a:prstGeom>
+          <a:noFill/>
+          <a:ln>
+            <a:noFill/>
+          </a:ln>
+        </p:spPr>
+        <p:txBody>
+          <a:bodyPr anchorCtr="0" anchor="t" bIns="91425" lIns="91425" spcFirstLastPara="1" rIns="91425" wrap="square" tIns="91425">
+            <a:spAutoFit/>
+          </a:bodyPr>
+          <a:lstStyle/>
+          <a:p>
+            <a:pPr indent="0" lvl="0" marL="0" rtl="0" algn="l">
+              <a:spcBef>
+                <a:spcPts val="0"/>
+              </a:spcBef>
+              <a:spcAft>
+                <a:spcPts val="0"/>
+              </a:spcAft>
+              <a:buNone/>
+            </a:pPr>
+            <a:r>
+              <a:rPr lang="en"/>
+              <a:t>&lt;p&gt;</a:t>
+            </a:r>
+            <a:endParaRPr/>
+          </a:p>
+          <a:p>
+            <a:pPr indent="0" lvl="0" marL="0" rtl="0" algn="l">
+              <a:spcBef>
+                <a:spcPts val="0"/>
+              </a:spcBef>
+              <a:spcAft>
+                <a:spcPts val="0"/>
+              </a:spcAft>
+              <a:buNone/>
+            </a:pPr>
+            <a:r>
+              <a:rPr lang="en"/>
+              <a:t>    &lt;span class="spanClass" id="last"&gt;This text is going to be tested&lt;/span&gt;</a:t>
+            </a:r>
+            <a:endParaRPr/>
+          </a:p>
+          <a:p>
+            <a:pPr indent="0" lvl="0" marL="0" rtl="0" algn="l">
+              <a:spcBef>
+                <a:spcPts val="0"/>
+              </a:spcBef>
+              <a:spcAft>
+                <a:spcPts val="0"/>
+              </a:spcAft>
+              <a:buNone/>
+            </a:pPr>
+            <a:r>
+              <a:rPr lang="en"/>
+              <a:t>&lt;/p&gt;</a:t>
+            </a:r>
+            <a:endParaRPr/>
+          </a:p>
+        </p:txBody>
+      </p:sp>
     </p:spTree>
   </p:cSld>
   <p:clrMapOvr>
@@ -24293,7 +24367,7 @@
   <p:cSld>
     <p:spTree>
       <p:nvGrpSpPr>
-        <p:cNvPr id="276" name="Shape 276"/>
+        <p:cNvPr id="277" name="Shape 277"/>
         <p:cNvGrpSpPr/>
         <p:nvPr/>
       </p:nvGrpSpPr>
@@ -24307,7 +24381,7 @@
       </p:grpSpPr>
       <p:sp>
         <p:nvSpPr>
-          <p:cNvPr id="277" name="Google Shape;277;g3296ee86163_1_29"/>
+          <p:cNvPr id="278" name="Google Shape;278;g3296ee86163_1_29"/>
           <p:cNvSpPr txBox="1"/>
           <p:nvPr>
             <p:ph type="title"/>
@@ -24394,7 +24468,7 @@
   <p:cSld>
     <p:spTree>
       <p:nvGrpSpPr>
-        <p:cNvPr id="281" name="Shape 281"/>
+        <p:cNvPr id="282" name="Shape 282"/>
         <p:cNvGrpSpPr/>
         <p:nvPr/>
       </p:nvGrpSpPr>
@@ -24408,7 +24482,7 @@
       </p:grpSpPr>
       <p:sp>
         <p:nvSpPr>
-          <p:cNvPr id="282" name="Google Shape;282;g2f62552a751_0_61"/>
+          <p:cNvPr id="283" name="Google Shape;283;g2f62552a751_0_61"/>
           <p:cNvSpPr txBox="1"/>
           <p:nvPr>
             <p:ph type="title"/>
@@ -24464,7 +24538,7 @@
       </p:sp>
       <p:sp>
         <p:nvSpPr>
-          <p:cNvPr id="283" name="Google Shape;283;g2f62552a751_0_61"/>
+          <p:cNvPr id="284" name="Google Shape;284;g2f62552a751_0_61"/>
           <p:cNvSpPr txBox="1"/>
           <p:nvPr>
             <p:ph idx="1" type="body"/>
@@ -24888,7 +24962,7 @@
       </p:sp>
       <p:sp>
         <p:nvSpPr>
-          <p:cNvPr id="284" name="Google Shape;284;g2f62552a751_0_61"/>
+          <p:cNvPr id="285" name="Google Shape;285;g2f62552a751_0_61"/>
           <p:cNvSpPr txBox="1"/>
           <p:nvPr/>
         </p:nvSpPr>
@@ -24943,7 +25017,7 @@
       </p:sp>
       <p:sp>
         <p:nvSpPr>
-          <p:cNvPr id="285" name="Google Shape;285;g2f62552a751_0_61"/>
+          <p:cNvPr id="286" name="Google Shape;286;g2f62552a751_0_61"/>
           <p:cNvSpPr txBox="1"/>
           <p:nvPr/>
         </p:nvSpPr>
@@ -24998,7 +25072,7 @@
       </p:sp>
       <p:sp>
         <p:nvSpPr>
-          <p:cNvPr id="286" name="Google Shape;286;g2f62552a751_0_61"/>
+          <p:cNvPr id="287" name="Google Shape;287;g2f62552a751_0_61"/>
           <p:cNvSpPr txBox="1"/>
           <p:nvPr/>
         </p:nvSpPr>
@@ -25064,7 +25138,7 @@
   <p:cSld>
     <p:spTree>
       <p:nvGrpSpPr>
-        <p:cNvPr id="290" name="Shape 290"/>
+        <p:cNvPr id="291" name="Shape 291"/>
         <p:cNvGrpSpPr/>
         <p:nvPr/>
       </p:nvGrpSpPr>
@@ -25078,7 +25152,7 @@
       </p:grpSpPr>
       <p:sp>
         <p:nvSpPr>
-          <p:cNvPr id="291" name="Google Shape;291;g2f62552a751_0_66"/>
+          <p:cNvPr id="292" name="Google Shape;292;g2f62552a751_0_66"/>
           <p:cNvSpPr txBox="1"/>
           <p:nvPr>
             <p:ph type="title"/>
@@ -25126,7 +25200,7 @@
       </p:sp>
       <p:sp>
         <p:nvSpPr>
-          <p:cNvPr id="292" name="Google Shape;292;g2f62552a751_0_66"/>
+          <p:cNvPr id="293" name="Google Shape;293;g2f62552a751_0_66"/>
           <p:cNvSpPr txBox="1"/>
           <p:nvPr>
             <p:ph idx="1" type="body"/>
@@ -25649,7 +25723,7 @@
       </p:sp>
       <p:sp>
         <p:nvSpPr>
-          <p:cNvPr id="293" name="Google Shape;293;g2f62552a751_0_66"/>
+          <p:cNvPr id="294" name="Google Shape;294;g2f62552a751_0_66"/>
           <p:cNvSpPr/>
           <p:nvPr/>
         </p:nvSpPr>
@@ -25755,7 +25829,7 @@
       </p:sp>
       <p:sp>
         <p:nvSpPr>
-          <p:cNvPr id="294" name="Google Shape;294;g2f62552a751_0_66"/>
+          <p:cNvPr id="295" name="Google Shape;295;g2f62552a751_0_66"/>
           <p:cNvSpPr/>
           <p:nvPr/>
         </p:nvSpPr>
@@ -25833,7 +25907,7 @@
   <p:cSld>
     <p:spTree>
       <p:nvGrpSpPr>
-        <p:cNvPr id="298" name="Shape 298"/>
+        <p:cNvPr id="299" name="Shape 299"/>
         <p:cNvGrpSpPr/>
         <p:nvPr/>
       </p:nvGrpSpPr>
@@ -25847,7 +25921,7 @@
       </p:grpSpPr>
       <p:sp>
         <p:nvSpPr>
-          <p:cNvPr id="299" name="Google Shape;299;p16"/>
+          <p:cNvPr id="300" name="Google Shape;300;p16"/>
           <p:cNvSpPr txBox="1"/>
           <p:nvPr>
             <p:ph type="title"/>
@@ -25895,7 +25969,7 @@
       </p:sp>
       <p:sp>
         <p:nvSpPr>
-          <p:cNvPr id="300" name="Google Shape;300;p16"/>
+          <p:cNvPr id="301" name="Google Shape;301;p16"/>
           <p:cNvSpPr txBox="1"/>
           <p:nvPr>
             <p:ph idx="1" type="body"/>
@@ -26266,7 +26340,7 @@
   <p:cSld>
     <p:spTree>
       <p:nvGrpSpPr>
-        <p:cNvPr id="304" name="Shape 304"/>
+        <p:cNvPr id="305" name="Shape 305"/>
         <p:cNvGrpSpPr/>
         <p:nvPr/>
       </p:nvGrpSpPr>
@@ -26280,7 +26354,7 @@
       </p:grpSpPr>
       <p:sp>
         <p:nvSpPr>
-          <p:cNvPr id="305" name="Google Shape;305;g2f62552a751_0_76"/>
+          <p:cNvPr id="306" name="Google Shape;306;g2f62552a751_0_76"/>
           <p:cNvSpPr txBox="1"/>
           <p:nvPr>
             <p:ph idx="1" type="body"/>

</xml_diff>